<commit_message>
intro ggplot lecture is OK
</commit_message>
<xml_diff>
--- a/Ggplot2_basic.pptx
+++ b/Ggplot2_basic.pptx
@@ -5216,36 +5216,6 @@
       </p:grpSpPr>
       <p:pic>
         <p:nvPicPr>
-          <p:cNvPr id="4" name="Image 3"/>
-          <p:cNvPicPr>
-            <a:picLocks noChangeAspect="1"/>
-          </p:cNvPicPr>
-          <p:nvPr/>
-        </p:nvPicPr>
-        <p:blipFill>
-          <a:blip r:embed="rId2">
-            <a:extLst>
-              <a:ext uri="{28A0092B-C50C-407E-A947-70E740481C1C}">
-                <a14:useLocalDpi xmlns:a14="http://schemas.microsoft.com/office/drawing/2010/main" val="0"/>
-              </a:ext>
-            </a:extLst>
-          </a:blip>
-          <a:stretch>
-            <a:fillRect/>
-          </a:stretch>
-        </p:blipFill>
-        <p:spPr>
-          <a:xfrm>
-            <a:off x="8725543" y="1682880"/>
-            <a:ext cx="1456841" cy="1681882"/>
-          </a:xfrm>
-          <a:prstGeom prst="rect">
-            <a:avLst/>
-          </a:prstGeom>
-        </p:spPr>
-      </p:pic>
-      <p:pic>
-        <p:nvPicPr>
           <p:cNvPr id="5" name="Image 4"/>
           <p:cNvPicPr>
             <a:picLocks noChangeAspect="1"/>
@@ -5253,7 +5223,7 @@
           <p:nvPr/>
         </p:nvPicPr>
         <p:blipFill>
-          <a:blip r:embed="rId3">
+          <a:blip r:embed="rId2">
             <a:extLst>
               <a:ext uri="{28A0092B-C50C-407E-A947-70E740481C1C}">
                 <a14:useLocalDpi xmlns:a14="http://schemas.microsoft.com/office/drawing/2010/main" val="0"/>
@@ -5376,6 +5346,36 @@
           </a:fontRef>
         </p:style>
       </p:cxnSp>
+      <p:pic>
+        <p:nvPicPr>
+          <p:cNvPr id="14" name="Image 13"/>
+          <p:cNvPicPr>
+            <a:picLocks noChangeAspect="1"/>
+          </p:cNvPicPr>
+          <p:nvPr/>
+        </p:nvPicPr>
+        <p:blipFill>
+          <a:blip r:embed="rId3">
+            <a:extLst>
+              <a:ext uri="{28A0092B-C50C-407E-A947-70E740481C1C}">
+                <a14:useLocalDpi xmlns:a14="http://schemas.microsoft.com/office/drawing/2010/main" val="0"/>
+              </a:ext>
+            </a:extLst>
+          </a:blip>
+          <a:stretch>
+            <a:fillRect/>
+          </a:stretch>
+        </p:blipFill>
+        <p:spPr>
+          <a:xfrm>
+            <a:off x="7650675" y="1658903"/>
+            <a:ext cx="1498378" cy="1729835"/>
+          </a:xfrm>
+          <a:prstGeom prst="rect">
+            <a:avLst/>
+          </a:prstGeom>
+        </p:spPr>
+      </p:pic>
     </p:spTree>
     <p:extLst>
       <p:ext uri="{BB962C8B-B14F-4D97-AF65-F5344CB8AC3E}">
@@ -5532,7 +5532,7 @@
       </p:sp>
       <p:pic>
         <p:nvPicPr>
-          <p:cNvPr id="13" name="Image 12"/>
+          <p:cNvPr id="14" name="Image 13"/>
           <p:cNvPicPr>
             <a:picLocks noChangeAspect="1"/>
           </p:cNvPicPr>
@@ -5552,8 +5552,8 @@
         </p:blipFill>
         <p:spPr>
           <a:xfrm>
-            <a:off x="1053986" y="1770531"/>
-            <a:ext cx="1456841" cy="1681882"/>
+            <a:off x="1033218" y="1441927"/>
+            <a:ext cx="1498378" cy="1729835"/>
           </a:xfrm>
           <a:prstGeom prst="rect">
             <a:avLst/>
@@ -5599,7 +5599,7 @@
       </p:grpSpPr>
       <p:pic>
         <p:nvPicPr>
-          <p:cNvPr id="4" name="Image 3"/>
+          <p:cNvPr id="5" name="Image 4"/>
           <p:cNvPicPr>
             <a:picLocks noChangeAspect="1"/>
           </p:cNvPicPr>
@@ -5619,36 +5619,6 @@
         </p:blipFill>
         <p:spPr>
           <a:xfrm>
-            <a:off x="8725543" y="1682880"/>
-            <a:ext cx="1456841" cy="1681882"/>
-          </a:xfrm>
-          <a:prstGeom prst="rect">
-            <a:avLst/>
-          </a:prstGeom>
-        </p:spPr>
-      </p:pic>
-      <p:pic>
-        <p:nvPicPr>
-          <p:cNvPr id="5" name="Image 4"/>
-          <p:cNvPicPr>
-            <a:picLocks noChangeAspect="1"/>
-          </p:cNvPicPr>
-          <p:nvPr/>
-        </p:nvPicPr>
-        <p:blipFill>
-          <a:blip r:embed="rId3">
-            <a:extLst>
-              <a:ext uri="{28A0092B-C50C-407E-A947-70E740481C1C}">
-                <a14:useLocalDpi xmlns:a14="http://schemas.microsoft.com/office/drawing/2010/main" val="0"/>
-              </a:ext>
-            </a:extLst>
-          </a:blip>
-          <a:stretch>
-            <a:fillRect/>
-          </a:stretch>
-        </p:blipFill>
-        <p:spPr>
-          <a:xfrm>
             <a:off x="4479009" y="402273"/>
             <a:ext cx="2050657" cy="1589259"/>
           </a:xfrm>
@@ -5696,7 +5666,7 @@
           <p:nvPr/>
         </p:nvPicPr>
         <p:blipFill>
-          <a:blip r:embed="rId4"/>
+          <a:blip r:embed="rId3"/>
           <a:stretch>
             <a:fillRect/>
           </a:stretch>
@@ -5720,7 +5690,7 @@
           <p:nvPr/>
         </p:nvPicPr>
         <p:blipFill>
-          <a:blip r:embed="rId5"/>
+          <a:blip r:embed="rId4"/>
           <a:stretch>
             <a:fillRect/>
           </a:stretch>
@@ -5807,6 +5777,36 @@
           </a:fontRef>
         </p:style>
       </p:cxnSp>
+      <p:pic>
+        <p:nvPicPr>
+          <p:cNvPr id="10" name="Image 9"/>
+          <p:cNvPicPr>
+            <a:picLocks noChangeAspect="1"/>
+          </p:cNvPicPr>
+          <p:nvPr/>
+        </p:nvPicPr>
+        <p:blipFill>
+          <a:blip r:embed="rId5">
+            <a:extLst>
+              <a:ext uri="{28A0092B-C50C-407E-A947-70E740481C1C}">
+                <a14:useLocalDpi xmlns:a14="http://schemas.microsoft.com/office/drawing/2010/main" val="0"/>
+              </a:ext>
+            </a:extLst>
+          </a:blip>
+          <a:stretch>
+            <a:fillRect/>
+          </a:stretch>
+        </p:blipFill>
+        <p:spPr>
+          <a:xfrm>
+            <a:off x="7650675" y="1658903"/>
+            <a:ext cx="1498378" cy="1729835"/>
+          </a:xfrm>
+          <a:prstGeom prst="rect">
+            <a:avLst/>
+          </a:prstGeom>
+        </p:spPr>
+      </p:pic>
     </p:spTree>
     <p:extLst>
       <p:ext uri="{BB962C8B-B14F-4D97-AF65-F5344CB8AC3E}">
@@ -5846,36 +5846,6 @@
       </p:grpSpPr>
       <p:pic>
         <p:nvPicPr>
-          <p:cNvPr id="4" name="Image 3"/>
-          <p:cNvPicPr>
-            <a:picLocks noChangeAspect="1"/>
-          </p:cNvPicPr>
-          <p:nvPr/>
-        </p:nvPicPr>
-        <p:blipFill>
-          <a:blip r:embed="rId2">
-            <a:extLst>
-              <a:ext uri="{28A0092B-C50C-407E-A947-70E740481C1C}">
-                <a14:useLocalDpi xmlns:a14="http://schemas.microsoft.com/office/drawing/2010/main" val="0"/>
-              </a:ext>
-            </a:extLst>
-          </a:blip>
-          <a:stretch>
-            <a:fillRect/>
-          </a:stretch>
-        </p:blipFill>
-        <p:spPr>
-          <a:xfrm>
-            <a:off x="8725543" y="1682880"/>
-            <a:ext cx="1456841" cy="1681882"/>
-          </a:xfrm>
-          <a:prstGeom prst="rect">
-            <a:avLst/>
-          </a:prstGeom>
-        </p:spPr>
-      </p:pic>
-      <p:pic>
-        <p:nvPicPr>
           <p:cNvPr id="5" name="Image 4"/>
           <p:cNvPicPr>
             <a:picLocks noChangeAspect="1"/>
@@ -5883,7 +5853,7 @@
           <p:nvPr/>
         </p:nvPicPr>
         <p:blipFill>
-          <a:blip r:embed="rId3">
+          <a:blip r:embed="rId2">
             <a:extLst>
               <a:ext uri="{28A0092B-C50C-407E-A947-70E740481C1C}">
                 <a14:useLocalDpi xmlns:a14="http://schemas.microsoft.com/office/drawing/2010/main" val="0"/>
@@ -6015,7 +5985,7 @@
           <p:nvPr/>
         </p:nvPicPr>
         <p:blipFill>
-          <a:blip r:embed="rId4"/>
+          <a:blip r:embed="rId3"/>
           <a:stretch>
             <a:fillRect/>
           </a:stretch>
@@ -6039,7 +6009,7 @@
           <p:nvPr/>
         </p:nvPicPr>
         <p:blipFill>
-          <a:blip r:embed="rId5"/>
+          <a:blip r:embed="rId4"/>
           <a:stretch>
             <a:fillRect/>
           </a:stretch>
@@ -6048,6 +6018,36 @@
           <a:xfrm>
             <a:off x="7256863" y="3503908"/>
             <a:ext cx="4394200" cy="1054100"/>
+          </a:xfrm>
+          <a:prstGeom prst="rect">
+            <a:avLst/>
+          </a:prstGeom>
+        </p:spPr>
+      </p:pic>
+      <p:pic>
+        <p:nvPicPr>
+          <p:cNvPr id="12" name="Image 11"/>
+          <p:cNvPicPr>
+            <a:picLocks noChangeAspect="1"/>
+          </p:cNvPicPr>
+          <p:nvPr/>
+        </p:nvPicPr>
+        <p:blipFill>
+          <a:blip r:embed="rId5">
+            <a:extLst>
+              <a:ext uri="{28A0092B-C50C-407E-A947-70E740481C1C}">
+                <a14:useLocalDpi xmlns:a14="http://schemas.microsoft.com/office/drawing/2010/main" val="0"/>
+              </a:ext>
+            </a:extLst>
+          </a:blip>
+          <a:stretch>
+            <a:fillRect/>
+          </a:stretch>
+        </p:blipFill>
+        <p:spPr>
+          <a:xfrm>
+            <a:off x="7650675" y="1658903"/>
+            <a:ext cx="1498378" cy="1729835"/>
           </a:xfrm>
           <a:prstGeom prst="rect">
             <a:avLst/>

</xml_diff>